<commit_message>
Deployed 73a3977 with MkDocs version: 1.3.1
</commit_message>
<xml_diff>
--- a/en/syllabus/syllabus.en.md_word.pptx
+++ b/en/syllabus/syllabus.en.md_word.pptx
@@ -63,7 +63,6 @@
     <p:sldId id="311" r:id="rId57"/>
     <p:sldId id="312" r:id="rId58"/>
     <p:sldId id="313" r:id="rId59"/>
-    <p:sldId id="314" r:id="rId60"/>
   </p:sldIdLst>
   <p:sldSz cx="9144000" cy="6858000" type="screen4x3"/>
   <p:notesSz cx="6858000" cy="9144000"/>
@@ -5408,7 +5407,7 @@
             </a:pPr>
             <a:r>
               <a:rPr/>
-              <a:t>The basic teaching method of this course will be planned to be face-to-face in the classroom, and support resources, home works, and announcements will be shared over google classroom. Students are expected to be in the university. This responsibility is very important to complete this course with success. If pandemic situation changes and distance education is required during this course, this course will be done using synchronous and asynchronous distance education methods. In this scenario, students are expected to be in the online platform, zoom, or meet at the time specified in the course schedule. Attendance will be taken.</a:t>
+              <a:t>The basic teaching method of this course will be planned to be face-to-face in the classroom, and support resources, home works, and announcements will be shared over google classroom. In unexpected situations course will be planned for online for disaster scenarios. Students are expected to be in the university if face-to-face method selected. This responsibility is very important to complete this course with success. If pandemic situation changes and distance education is required during this course, this course will be done using synchronous and asynchronous distance education methods. In this scenario, students are expected to be in the online platform, zoom, or meet at the time specified in the course schedule. Attendance will be taken.</a:t>
             </a:r>
           </a:p>
         </p:txBody>
@@ -5480,7 +5479,7 @@
             </a:pPr>
             <a:r>
               <a:rPr/>
-              <a:t>Throughout the semester, assignments must be submitted as specified by the announced deadline. Your grade will be reduced by 10% of the full points for each calendar day for overdue assignments.</a:t>
+              <a:t>Throughout the semester, assignments must be submitted as specified by the announced deadline. Overdue assignments will not be accepted.</a:t>
             </a:r>
           </a:p>
         </p:txBody>
@@ -5527,7 +5526,7 @@
             </a:pPr>
             <a:r>
               <a:rPr/>
-              <a:t>Overdue assignments will not be accepted after three (3) days.</a:t>
+              <a:t>Unexpected situations must be reported to the instructor for late home works by students.</a:t>
             </a:r>
           </a:p>
         </p:txBody>
@@ -5626,7 +5625,7 @@
             </a:pPr>
             <a:r>
               <a:rPr b="1"/>
-              <a:t>Spring Semester, 2021-2022</a:t>
+              <a:t>Spring Semester, 2022-2023</a:t>
             </a:r>
           </a:p>
           <a:p>
@@ -5676,7 +5675,7 @@
               <a:rPr>
                 <a:hlinkClick r:id="rId5"/>
               </a:rPr>
-              <a:t>WORD</a:t>
+              <a:t>WORD (legacy)</a:t>
             </a:r>
             <a:r>
               <a:rPr/>
@@ -5686,7 +5685,7 @@
               <a:rPr>
                 <a:hlinkClick r:id="rId6"/>
               </a:rPr>
-              <a:t>PDF</a:t>
+              <a:t>PDF(legacy)</a:t>
             </a:r>
           </a:p>
         </p:txBody>
@@ -5715,6 +5714,31 @@
       </p:grpSpPr>
       <p:sp>
         <p:nvSpPr>
+          <p:cNvPr id="2" name="Title 1"/>
+          <p:cNvSpPr>
+            <a:spLocks noGrp="1"/>
+          </p:cNvSpPr>
+          <p:nvPr>
+            <p:ph type="title"/>
+          </p:nvPr>
+        </p:nvSpPr>
+        <p:spPr/>
+        <p:txBody>
+          <a:bodyPr/>
+          <a:lstStyle/>
+          <a:p>
+            <a:pPr lvl="0" indent="0" marL="0">
+              <a:buNone/>
+            </a:pPr>
+            <a:r>
+              <a:rPr/>
+              <a:t>H. Course Platform and Communication</a:t>
+            </a:r>
+          </a:p>
+        </p:txBody>
+      </p:sp>
+      <p:sp>
+        <p:nvSpPr>
           <p:cNvPr id="3" name="Content Placeholder 2"/>
           <p:cNvSpPr>
             <a:spLocks noGrp="1"/>
@@ -5733,7 +5757,15 @@
             </a:pPr>
             <a:r>
               <a:rPr/>
-              <a:t>Unexpected situations must be reported to the instructor for late home works by students.</a:t>
+              <a:t>Google Classroom and Microsoft Teams will be used as a course learning management system. All electronic resources and announcements about the course will be shared on this platform. It is very important to check the course page daily, access the necessary resources and announcements, and communicate with the instructor as you need </a:t>
+            </a:r>
+            <a:r>
+              <a:rPr b="1"/>
+              <a:t>Algorithms and Programming I</a:t>
+            </a:r>
+            <a:r>
+              <a:rPr/>
+              <a:t> programming skills to complete the course with success</a:t>
             </a:r>
           </a:p>
         </p:txBody>
@@ -5780,7 +5812,7 @@
             </a:pPr>
             <a:r>
               <a:rPr/>
-              <a:t>H. Course Platform and Communication</a:t>
+              <a:t>I. Academic Integrity, Plagiarism &amp; Cheating</a:t>
             </a:r>
           </a:p>
         </p:txBody>
@@ -5805,15 +5837,7 @@
             </a:pPr>
             <a:r>
               <a:rPr/>
-              <a:t>Google Classroom will be used as a course learning management system. All electronic resources and announcements about the course will be shared on this platform. It is very important to check the course page daily, access the necessary resources and announcements, and communicate with the instructor as you need </a:t>
-            </a:r>
-            <a:r>
-              <a:rPr b="1"/>
-              <a:t>Algorithms and Programming I</a:t>
-            </a:r>
-            <a:r>
-              <a:rPr/>
-              <a:t> programming skills to complete the course with success</a:t>
+              <a:t>Academic Integrity is one of the most important principles of RTEÜ University. Anyone who breaches the principles of academic honesty is severely punished.</a:t>
             </a:r>
           </a:p>
         </p:txBody>
@@ -5842,12 +5866,12 @@
       </p:grpSpPr>
       <p:sp>
         <p:nvSpPr>
-          <p:cNvPr id="2" name="Title 1"/>
-          <p:cNvSpPr>
-            <a:spLocks noGrp="1"/>
-          </p:cNvSpPr>
-          <p:nvPr>
-            <p:ph type="title"/>
+          <p:cNvPr id="3" name="Content Placeholder 2"/>
+          <p:cNvSpPr>
+            <a:spLocks noGrp="1"/>
+          </p:cNvSpPr>
+          <p:nvPr>
+            <p:ph idx="1"/>
           </p:nvPr>
         </p:nvSpPr>
         <p:spPr/>
@@ -5860,32 +5884,7 @@
             </a:pPr>
             <a:r>
               <a:rPr/>
-              <a:t>I. Academic Integrity, Plagiarism &amp; Cheating</a:t>
-            </a:r>
-          </a:p>
-        </p:txBody>
-      </p:sp>
-      <p:sp>
-        <p:nvSpPr>
-          <p:cNvPr id="3" name="Content Placeholder 2"/>
-          <p:cNvSpPr>
-            <a:spLocks noGrp="1"/>
-          </p:cNvSpPr>
-          <p:nvPr>
-            <p:ph idx="1"/>
-          </p:nvPr>
-        </p:nvSpPr>
-        <p:spPr/>
-        <p:txBody>
-          <a:bodyPr/>
-          <a:lstStyle/>
-          <a:p>
-            <a:pPr lvl="0" indent="0" marL="0">
-              <a:buNone/>
-            </a:pPr>
-            <a:r>
-              <a:rPr/>
-              <a:t>Academic Integrity is one of the most important principles of RTEÜ University. Anyone who breaches the principles of academic honesty is severely punished.</a:t>
+              <a:t>It is natural to interact with classmates and others t.”study together”. It may also be the case where a student asks to help from someone else, paid or unpaid, better understand a difficult topic or a whole course. However, what is the borderline between “studying together” or “taking private lessons” and “academic dishonesty”? When is it plagiarism, when is it cheating?</a:t>
             </a:r>
           </a:p>
         </p:txBody>
@@ -5932,7 +5931,16 @@
             </a:pPr>
             <a:r>
               <a:rPr/>
-              <a:t>It is natural to interact with classmates and others t.”study together”. It may also be the case where a student asks to help from someone else, paid or unpaid, better understand a difficult topic or a whole course. However, what is the borderline between “studying together” or “taking private lessons” and “academic dishonesty”? When is it plagiarism, when is it cheating?</a:t>
+              <a:t>It is obvious that looking at another student’s paper or any source other than what is allowed during the exam is cheating and will be punished. However, it is known that many students come to university with very little experience concerning what is acceptable and what counts as “copying,”” especially for assignments.</a:t>
+            </a:r>
+          </a:p>
+          <a:p>
+            <a:pPr lvl="0" indent="0" marL="0">
+              <a:buNone/>
+            </a:pPr>
+            <a:r>
+              <a:rPr/>
+              <a:t>The following are attempted as guidelines for the Faculty of Engineering and Architecture students to highlight the philosophy of academic honesty for assignments for which the student will be graded. Should a situation arise which is not described below, the student is advised to ask the instructor or assistant of the course whether what they intend to do would remain within the framework of academic honesty or not.</a:t>
             </a:r>
           </a:p>
         </p:txBody>
@@ -5975,20 +5983,21 @@
           <a:lstStyle/>
           <a:p>
             <a:pPr lvl="0" indent="0" marL="0">
+              <a:spcBef>
+                <a:spcPts val="3000"/>
+              </a:spcBef>
               <a:buNone/>
             </a:pPr>
             <a:r>
+              <a:rPr b="1"/>
+              <a:t>a. What is acceptable when preparing an assignment?</a:t>
+            </a:r>
+          </a:p>
+          <a:p>
+            <a:pPr lvl="0"/>
+            <a:r>
               <a:rPr/>
-              <a:t>It is obvious that looking at another student’s paper or any source other than what is allowed during the exam is cheating and will be punished. However, it is known that many students come to university with very little experience concerning what is acceptable and what counts as “copying,”” especially for assignments.</a:t>
-            </a:r>
-          </a:p>
-          <a:p>
-            <a:pPr lvl="0" indent="0" marL="0">
-              <a:buNone/>
-            </a:pPr>
-            <a:r>
-              <a:rPr/>
-              <a:t>The following are attempted as guidelines for the Faculty of Engineering and Architecture students to highlight the philosophy of academic honesty for assignments for which the student will be graded. Should a situation arise which is not described below, the student is advised to ask the instructor or assistant of the course whether what they intend to do would remain within the framework of academic honesty or not.</a:t>
+              <a:t>Communicating with classmates about the assignment to understand it better</a:t>
             </a:r>
           </a:p>
         </p:txBody>
@@ -6030,22 +6039,24 @@
           <a:bodyPr/>
           <a:lstStyle/>
           <a:p>
-            <a:pPr lvl="0" indent="0" marL="0">
-              <a:spcBef>
-                <a:spcPts val="3000"/>
-              </a:spcBef>
-              <a:buNone/>
-            </a:pPr>
-            <a:r>
-              <a:rPr b="1"/>
-              <a:t>a. What is acceptable when preparing an assignment?</a:t>
-            </a:r>
-          </a:p>
-          <a:p>
             <a:pPr lvl="0"/>
             <a:r>
               <a:rPr/>
-              <a:t>Communicating with classmates about the assignment to understand it better</a:t>
+              <a:t>Putting ideas, quotes, paragraphs, small pieces of code (snippets) that you find online or elsewhere into your assignment, provided that</a:t>
+            </a:r>
+          </a:p>
+          <a:p>
+            <a:pPr lvl="1"/>
+            <a:r>
+              <a:rPr/>
+              <a:t>these are not themselves the whole solution to the assignment,</a:t>
+            </a:r>
+          </a:p>
+          <a:p>
+            <a:pPr lvl="1"/>
+            <a:r>
+              <a:rPr/>
+              <a:t>you cite the origins of these</a:t>
             </a:r>
           </a:p>
         </p:txBody>
@@ -6090,21 +6101,14 @@
             <a:pPr lvl="0"/>
             <a:r>
               <a:rPr/>
-              <a:t>Putting ideas, quotes, paragraphs, small pieces of code (snippets) that you find online or elsewhere into your assignment, provided that</a:t>
-            </a:r>
-          </a:p>
-          <a:p>
-            <a:pPr lvl="1"/>
+              <a:t>Asking sources for help in guiding you for the English language content of your assignment.</a:t>
+            </a:r>
+          </a:p>
+          <a:p>
+            <a:pPr lvl="0"/>
             <a:r>
               <a:rPr/>
-              <a:t>these are not themselves the whole solution to the assignment,</a:t>
-            </a:r>
-          </a:p>
-          <a:p>
-            <a:pPr lvl="1"/>
-            <a:r>
-              <a:rPr/>
-              <a:t>you cite the origins of these</a:t>
+              <a:t>Sharing small pieces of your assignment in the classroom to create a class discussion on some controversial topics.</a:t>
             </a:r>
           </a:p>
         </p:txBody>
@@ -6149,14 +6153,21 @@
             <a:pPr lvl="0"/>
             <a:r>
               <a:rPr/>
-              <a:t>Asking sources for help in guiding you for the English language content of your assignment.</a:t>
+              <a:t>Turning to the web or elsewhere for instructions, references, and solutions to technical difficulties, but not for direct answers to the assignment</a:t>
             </a:r>
           </a:p>
           <a:p>
             <a:pPr lvl="0"/>
             <a:r>
               <a:rPr/>
-              <a:t>Sharing small pieces of your assignment in the classroom to create a class discussion on some controversial topics.</a:t>
+              <a:t>Discuss solutions to assignments with others using diagrams or summarized statements but not actual text or code.</a:t>
+            </a:r>
+          </a:p>
+          <a:p>
+            <a:pPr lvl="0"/>
+            <a:r>
+              <a:rPr/>
+              <a:t>Working with (and even paying) a tutor to help you with the course, provided the tutor does not do your assignment for you.</a:t>
             </a:r>
           </a:p>
         </p:txBody>
@@ -6198,24 +6209,36 @@
           <a:bodyPr/>
           <a:lstStyle/>
           <a:p>
+            <a:pPr lvl="0" indent="0" marL="0">
+              <a:spcBef>
+                <a:spcPts val="3000"/>
+              </a:spcBef>
+              <a:buNone/>
+            </a:pPr>
+            <a:r>
+              <a:rPr b="1"/>
+              <a:t>b. What is not acceptable?</a:t>
+            </a:r>
+          </a:p>
+          <a:p>
             <a:pPr lvl="0"/>
             <a:r>
               <a:rPr/>
-              <a:t>Turning to the web or elsewhere for instructions, references, and solutions to technical difficulties, but not for direct answers to the assignment</a:t>
+              <a:t>Ask a classmate to see their solution to a problem before submitting your own.</a:t>
             </a:r>
           </a:p>
           <a:p>
             <a:pPr lvl="0"/>
             <a:r>
               <a:rPr/>
-              <a:t>Discuss solutions to assignments with others using diagrams or summarized statements but not actual text or code.</a:t>
+              <a:t>Failing to cite the origins of any text (or code for programming courses) that you discover outside of the course’s lessons and integrate into your work</a:t>
             </a:r>
           </a:p>
           <a:p>
             <a:pPr lvl="0"/>
             <a:r>
               <a:rPr/>
-              <a:t>Working with (and even paying) a tutor to help you with the course, provided the tutor does not do your assignment for you.</a:t>
+              <a:t>You are giving or showing a classmate your solution to a problem when the classmate is struggling to solve it.</a:t>
             </a:r>
           </a:p>
         </p:txBody>
@@ -6244,6 +6267,31 @@
       </p:grpSpPr>
       <p:sp>
         <p:nvSpPr>
+          <p:cNvPr id="2" name="Title 1"/>
+          <p:cNvSpPr>
+            <a:spLocks noGrp="1"/>
+          </p:cNvSpPr>
+          <p:nvPr>
+            <p:ph type="title"/>
+          </p:nvPr>
+        </p:nvSpPr>
+        <p:spPr/>
+        <p:txBody>
+          <a:bodyPr/>
+          <a:lstStyle/>
+          <a:p>
+            <a:pPr lvl="0" indent="0" marL="0">
+              <a:buNone/>
+            </a:pPr>
+            <a:r>
+              <a:rPr/>
+              <a:t>J. Expectations</a:t>
+            </a:r>
+          </a:p>
+        </p:txBody>
+      </p:sp>
+      <p:sp>
+        <p:nvSpPr>
           <p:cNvPr id="3" name="Content Placeholder 2"/>
           <p:cNvSpPr>
             <a:spLocks noGrp="1"/>
@@ -6258,35 +6306,19 @@
           <a:lstStyle/>
           <a:p>
             <a:pPr lvl="0" indent="0" marL="0">
-              <a:spcBef>
-                <a:spcPts val="3000"/>
-              </a:spcBef>
               <a:buNone/>
             </a:pPr>
             <a:r>
-              <a:rPr b="1"/>
-              <a:t>b. What is not acceptable?</a:t>
-            </a:r>
-          </a:p>
-          <a:p>
-            <a:pPr lvl="0"/>
-            <a:r>
               <a:rPr/>
-              <a:t>Ask a classmate to see their solution to a problem before submitting your own.</a:t>
-            </a:r>
-          </a:p>
-          <a:p>
-            <a:pPr lvl="0"/>
+              <a:t>You are expected to attend classes on time by completing weekly course requirements (readings and assignments) during the semester. The main communication channel between the instructor and the students email emailed. Please send your questions to the instructor’s email address about the course via the email address provided to you by the university. </a:t>
+            </a:r>
+            <a:r>
+              <a:rPr b="1" i="1"/>
+              <a:t>Ensure that you include the course name in the subject field of your message and your name in the text field</a:t>
+            </a:r>
             <a:r>
               <a:rPr/>
-              <a:t>Failing to cite the origins of any text (or code for programming courses) that you discover outside of the course’s lessons and integrate into your work</a:t>
-            </a:r>
-          </a:p>
-          <a:p>
-            <a:pPr lvl="0"/>
-            <a:r>
-              <a:rPr/>
-              <a:t>You are giving or showing a classmate your solution to a problem when the classmate is struggling to solve it.</a:t>
+              <a:t>. In addition, the instructor will contact you via email if necessary. For this reason, it is very important to check your email address every day for healthy communication.</a:t>
             </a:r>
           </a:p>
         </p:txBody>
@@ -6461,7 +6493,7 @@
                       </a:pPr>
                       <a:r>
                         <a:rPr/>
-                        <a:t>bafwwt6</a:t>
+                        <a:t>hhgoiwu</a:t>
                       </a:r>
                     </a:p>
                   </a:txBody>
@@ -6478,6 +6510,38 @@
                       </a:pPr>
                       <a:r>
                         <a:rPr b="1"/>
+                        <a:t>Microsoft Teams Code</a:t>
+                      </a:r>
+                    </a:p>
+                  </a:txBody>
+                </a:tc>
+                <a:tc>
+                  <a:txBody>
+                    <a:bodyPr/>
+                    <a:lstStyle/>
+                    <a:p>
+                      <a:pPr lvl="0" indent="0" marL="0">
+                        <a:buNone/>
+                      </a:pPr>
+                      <a:r>
+                        <a:rPr/>
+                        <a:t>iqn0cia</a:t>
+                      </a:r>
+                    </a:p>
+                  </a:txBody>
+                </a:tc>
+              </a:tr>
+              <a:tr h="0">
+                <a:tc>
+                  <a:txBody>
+                    <a:bodyPr/>
+                    <a:lstStyle/>
+                    <a:p>
+                      <a:pPr lvl="0" indent="0" marL="0">
+                        <a:buNone/>
+                      </a:pPr>
+                      <a:r>
+                        <a:rPr b="1"/>
                         <a:t>Lecture Hours and Days</a:t>
                       </a:r>
                     </a:p>
@@ -6493,7 +6557,7 @@
                       </a:pPr>
                       <a:r>
                         <a:rPr/>
-                        <a:t>TBD</a:t>
+                        <a:t>Tuesday 09:00-12:00 (Theory) Friday 10:00-12:00 (Lab)</a:t>
                       </a:r>
                     </a:p>
                   </a:txBody>
@@ -6545,7 +6609,7 @@
             </a:pPr>
             <a:r>
               <a:rPr/>
-              <a:t>J. Expectations</a:t>
+              <a:t>K. Lecture Content and Syllabus Updates</a:t>
             </a:r>
           </a:p>
         </p:txBody>
@@ -6570,15 +6634,7 @@
             </a:pPr>
             <a:r>
               <a:rPr/>
-              <a:t>You are expected to attend classes on time by completing weekly course requirements (readings and assignments) during the semester. The main communication channel between the instructor and the students email emailed. Please send your questions to the instructor’s email address about the course via the email address provided to you by the university. </a:t>
-            </a:r>
-            <a:r>
-              <a:rPr b="1" i="1"/>
-              <a:t>Ensure that you include the course name in the subject field of your message and your name in the text field</a:t>
-            </a:r>
-            <a:r>
-              <a:rPr/>
-              <a:t>. In addition, the instructor will contact you via email if necessary. For this reason, it is very important to check your email address every day for healthy communication.</a:t>
+              <a:t>If deemed necessary, changes in the lecture content or course schedule can be made. If any changes are made in the scope of this document, the instructor will inform you about this.</a:t>
             </a:r>
           </a:p>
         </p:txBody>
@@ -6625,36 +6681,231 @@
             </a:pPr>
             <a:r>
               <a:rPr/>
-              <a:t>K. Lecture Content and Syllabus Updates</a:t>
-            </a:r>
-          </a:p>
-        </p:txBody>
-      </p:sp>
-      <p:sp>
-        <p:nvSpPr>
-          <p:cNvPr id="3" name="Content Placeholder 2"/>
-          <p:cNvSpPr>
-            <a:spLocks noGrp="1"/>
-          </p:cNvSpPr>
+              <a:t>Course Schedule Overview</a:t>
+            </a:r>
+          </a:p>
+        </p:txBody>
+      </p:sp>
+      <p:graphicFrame>
+        <p:nvGraphicFramePr>
+          <p:cNvPr id="6" name="Content Placeholder 5"/>
+          <p:cNvGraphicFramePr>
+            <a:graphicFrameLocks noGrp="1"/>
+          </p:cNvGraphicFramePr>
           <p:nvPr>
             <p:ph idx="1"/>
           </p:nvPr>
-        </p:nvSpPr>
-        <p:spPr/>
-        <p:txBody>
-          <a:bodyPr/>
-          <a:lstStyle/>
-          <a:p>
-            <a:pPr lvl="0" indent="0" marL="0">
-              <a:buNone/>
-            </a:pPr>
-            <a:r>
-              <a:rPr/>
-              <a:t>If deemed necessary, changes in the lecture content or course schedule can be made. If any changes are made in the scope of this document, the instructor will inform you about this.</a:t>
-            </a:r>
-          </a:p>
-        </p:txBody>
-      </p:sp>
+        </p:nvGraphicFramePr>
+        <p:xfrm>
+          <a:off x="457200" y="1600200"/>
+          <a:ext cx="8229600" cy="4521200"/>
+        </p:xfrm>
+        <a:graphic>
+          <a:graphicData uri="http://schemas.openxmlformats.org/drawingml/2006/table">
+            <a:tbl>
+              <a:tblPr firstRow="1" bandRow="1">
+                <a:tableStyleId>{5C22544A-7EE6-4342-B048-85BDC9FD1C3A}</a:tableStyleId>
+              </a:tblPr>
+              <a:tblGrid>
+                <a:gridCol w="2057400"/>
+                <a:gridCol w="2057400"/>
+                <a:gridCol w="2057400"/>
+                <a:gridCol w="2057400"/>
+              </a:tblGrid>
+              <a:tr h="0">
+                <a:tc>
+                  <a:txBody>
+                    <a:bodyPr/>
+                    <a:lstStyle/>
+                    <a:p>
+                      <a:pPr lvl="0" indent="0" marL="0" algn="l">
+                        <a:buNone/>
+                      </a:pPr>
+                      <a:r>
+                        <a:rPr/>
+                        <a:t>Weeks</a:t>
+                      </a:r>
+                    </a:p>
+                  </a:txBody>
+                  <a:tcPr/>
+                </a:tc>
+                <a:tc>
+                  <a:txBody>
+                    <a:bodyPr/>
+                    <a:lstStyle/>
+                    <a:p>
+                      <a:pPr lvl="0" indent="0" marL="0" algn="l">
+                        <a:buNone/>
+                      </a:pPr>
+                      <a:r>
+                        <a:rPr/>
+                        <a:t>Dates</a:t>
+                      </a:r>
+                    </a:p>
+                  </a:txBody>
+                  <a:tcPr/>
+                </a:tc>
+                <a:tc>
+                  <a:txBody>
+                    <a:bodyPr/>
+                    <a:lstStyle/>
+                    <a:p>
+                      <a:pPr lvl="0" indent="0" marL="0" algn="l">
+                        <a:buNone/>
+                      </a:pPr>
+                      <a:r>
+                        <a:rPr/>
+                        <a:t>Subjects</a:t>
+                      </a:r>
+                    </a:p>
+                  </a:txBody>
+                  <a:tcPr/>
+                </a:tc>
+                <a:tc>
+                  <a:txBody>
+                    <a:bodyPr/>
+                    <a:lstStyle/>
+                    <a:p>
+                      <a:pPr lvl="0" indent="0" marL="0" algn="l">
+                        <a:buNone/>
+                      </a:pPr>
+                      <a:r>
+                        <a:rPr/>
+                        <a:t>Other Tasks</a:t>
+                      </a:r>
+                    </a:p>
+                  </a:txBody>
+                  <a:tcPr/>
+                </a:tc>
+              </a:tr>
+              <a:tr h="0">
+                <a:tc>
+                  <a:txBody>
+                    <a:bodyPr/>
+                    <a:lstStyle/>
+                    <a:p>
+                      <a:pPr lvl="0" indent="0" marL="0" algn="l">
+                        <a:buNone/>
+                      </a:pPr>
+                      <a:r>
+                        <a:rPr/>
+                        <a:t>Week 1</a:t>
+                      </a:r>
+                    </a:p>
+                  </a:txBody>
+                </a:tc>
+                <a:tc>
+                  <a:txBody>
+                    <a:bodyPr/>
+                    <a:lstStyle/>
+                    <a:p>
+                      <a:pPr lvl="0" indent="0" marL="0" algn="l">
+                        <a:buNone/>
+                      </a:pPr>
+                      <a:r>
+                        <a:rPr/>
+                        <a:t>21.02.2023 24.02.2023</a:t>
+                      </a:r>
+                    </a:p>
+                  </a:txBody>
+                </a:tc>
+                <a:tc>
+                  <a:txBody>
+                    <a:bodyPr/>
+                    <a:lstStyle/>
+                    <a:p>
+                      <a:pPr lvl="0" indent="0" marL="0" algn="l">
+                        <a:buNone/>
+                      </a:pPr>
+                      <a:r>
+                        <a:rPr/>
+                        <a:t>Course Plan and Communication Grading System, Assignments and Exams. Algorithms Basics, Pseudocode,iv. RAM (Random Access Machine Model), Algorithm Cost Calculation for Time Complexity. Worst, Average and Best Case Summary Sorting Problem (Insertion and Merge Sort Analysis), 4. Asymptotic Notation(Big O, Big Teta,Big Omega, Small o, Small omega Notations)</a:t>
+                      </a:r>
+                    </a:p>
+                  </a:txBody>
+                </a:tc>
+                <a:tc>
+                  <a:txBody>
+                    <a:bodyPr/>
+                    <a:lstStyle/>
+                    <a:p>
+                      <a:pPr lvl="0" indent="0" marL="0" algn="l">
+                        <a:buNone/>
+                      </a:pPr>
+                      <a:r>
+                        <a:rPr/>
+                        <a:t>TBD</a:t>
+                      </a:r>
+                    </a:p>
+                  </a:txBody>
+                </a:tc>
+              </a:tr>
+              <a:tr h="0">
+                <a:tc>
+                  <a:txBody>
+                    <a:bodyPr/>
+                    <a:lstStyle/>
+                    <a:p>
+                      <a:pPr lvl="0" indent="0" marL="0" algn="l">
+                        <a:buNone/>
+                      </a:pPr>
+                      <a:r>
+                        <a:rPr/>
+                        <a:t>Week 2</a:t>
+                      </a:r>
+                    </a:p>
+                  </a:txBody>
+                </a:tc>
+                <a:tc>
+                  <a:txBody>
+                    <a:bodyPr/>
+                    <a:lstStyle/>
+                    <a:p>
+                      <a:pPr lvl="0" indent="0" marL="0" algn="l">
+                        <a:buNone/>
+                      </a:pPr>
+                      <a:r>
+                        <a:rPr/>
+                        <a:t>28.02.2023 03.03.2023</a:t>
+                      </a:r>
+                    </a:p>
+                  </a:txBody>
+                </a:tc>
+                <a:tc>
+                  <a:txBody>
+                    <a:bodyPr/>
+                    <a:lstStyle/>
+                    <a:p>
+                      <a:pPr lvl="0" indent="0" marL="0" algn="l">
+                        <a:buNone/>
+                      </a:pPr>
+                      <a:r>
+                        <a:rPr/>
+                        <a:t>Solving Recurrences (Recursion Tree, Master Method and Back-Substitution) Divide-and-Conquer Analysis (Merge Sort, Binary Search) Recurrence Solution</a:t>
+                      </a:r>
+                    </a:p>
+                  </a:txBody>
+                </a:tc>
+                <a:tc>
+                  <a:txBody>
+                    <a:bodyPr/>
+                    <a:lstStyle/>
+                    <a:p>
+                      <a:pPr lvl="0" indent="0" marL="0" algn="l">
+                        <a:buNone/>
+                      </a:pPr>
+                      <a:r>
+                        <a:rPr/>
+                        <a:t>TBD</a:t>
+                      </a:r>
+                    </a:p>
+                  </a:txBody>
+                </a:tc>
+              </a:tr>
+            </a:tbl>
+          </a:graphicData>
+        </a:graphic>
+      </p:graphicFrame>
     </p:spTree>
   </p:cSld>
 </p:sld>
@@ -6677,31 +6928,6 @@
           <a:chExt cx="0" cy="0"/>
         </a:xfrm>
       </p:grpSpPr>
-      <p:sp>
-        <p:nvSpPr>
-          <p:cNvPr id="2" name="Title 1"/>
-          <p:cNvSpPr>
-            <a:spLocks noGrp="1"/>
-          </p:cNvSpPr>
-          <p:nvPr>
-            <p:ph type="title"/>
-          </p:nvPr>
-        </p:nvSpPr>
-        <p:spPr/>
-        <p:txBody>
-          <a:bodyPr/>
-          <a:lstStyle/>
-          <a:p>
-            <a:pPr lvl="0" indent="0" marL="0">
-              <a:buNone/>
-            </a:pPr>
-            <a:r>
-              <a:rPr/>
-              <a:t>Course Schedule Overview</a:t>
-            </a:r>
-          </a:p>
-        </p:txBody>
-      </p:sp>
       <p:graphicFrame>
         <p:nvGraphicFramePr>
           <p:cNvPr id="6" name="Content Placeholder 5"/>
@@ -6739,7 +6965,7 @@
                       </a:pPr>
                       <a:r>
                         <a:rPr/>
-                        <a:t>Weeks</a:t>
+                        <a:t>Week 3</a:t>
                       </a:r>
                     </a:p>
                   </a:txBody>
@@ -6755,7 +6981,7 @@
                       </a:pPr>
                       <a:r>
                         <a:rPr/>
-                        <a:t>Dates</a:t>
+                        <a:t>07.03.2023 10.03.2023</a:t>
                       </a:r>
                     </a:p>
                   </a:txBody>
@@ -6771,7 +6997,7 @@
                       </a:pPr>
                       <a:r>
                         <a:rPr/>
-                        <a:t>Subjects</a:t>
+                        <a:t>Matrix Multiplication(Traditional,Recursive,Strassen),Quicksort(Hoare and Lomuto Partitioning,Recursive Sorting),Quicksort Analysis,Randomized Quicksort, Randomized Selection(Recursive,Medians) Heaps (Max / Min Heap, Heap Data Structure, Iterative and Recursive Heapify, Extract-Max, Build Heap) Heap Sort, Priority Queues, Linked Lists, Radix Sort,Counting Sort</a:t>
                       </a:r>
                     </a:p>
                   </a:txBody>
@@ -6787,7 +7013,7 @@
                       </a:pPr>
                       <a:r>
                         <a:rPr/>
-                        <a:t>Other Tasks</a:t>
+                        <a:t>Midterm Homework-1 Will Be Sent on 07.03.2023</a:t>
                       </a:r>
                     </a:p>
                   </a:txBody>
@@ -6805,7 +7031,7 @@
                       </a:pPr>
                       <a:r>
                         <a:rPr/>
-                        <a:t>Week 1</a:t>
+                        <a:t>Week 4</a:t>
                       </a:r>
                     </a:p>
                   </a:txBody>
@@ -6820,7 +7046,7 @@
                       </a:pPr>
                       <a:r>
                         <a:rPr/>
-                        <a:t>TBD</a:t>
+                        <a:t>14.03.2023 17.03.2023</a:t>
                       </a:r>
                     </a:p>
                   </a:txBody>
@@ -6835,7 +7061,7 @@
                       </a:pPr>
                       <a:r>
                         <a:rPr/>
-                        <a:t>Course Plan and Communication Grading System, Assignments and Exams. Algorithms Basics, Pseudocode,iv. RAM (Random Access Machine Model), Algorithm Cost Calculation for Time Complexity. Worst, Average and Best Case Summary Sorting Problem (Insertion and Merge Sort Analysis), 4. Asymptotic Notation(Big O, Big Teta,Big Omega, Small o, Small omega Notations)</a:t>
+                        <a:t>Midterm Homework-1 Controls and Review with Summary</a:t>
                       </a:r>
                     </a:p>
                   </a:txBody>
@@ -6850,7 +7076,7 @@
                       </a:pPr>
                       <a:r>
                         <a:rPr/>
-                        <a:t>TBD</a:t>
+                        <a:t>Midterm Homework-1 Due-Date 14.03.2023</a:t>
                       </a:r>
                     </a:p>
                   </a:txBody>
@@ -6867,7 +7093,7 @@
                       </a:pPr>
                       <a:r>
                         <a:rPr/>
-                        <a:t>Week 2</a:t>
+                        <a:t>Week 5</a:t>
                       </a:r>
                     </a:p>
                   </a:txBody>
@@ -6882,7 +7108,7 @@
                       </a:pPr>
                       <a:r>
                         <a:rPr/>
-                        <a:t>TBD</a:t>
+                        <a:t>21.03.2023 24.03.2023</a:t>
                       </a:r>
                     </a:p>
                   </a:txBody>
@@ -6897,7 +7123,7 @@
                       </a:pPr>
                       <a:r>
                         <a:rPr/>
-                        <a:t>Solving Recurrences (Recursion Tree, Master Method and Back-Substitution) Divide-and-Conquer Analysis (Merge Sort, Binary Search) Recurrence Solution</a:t>
+                        <a:t>Convex Hull (Divide &amp; Conquer) Dynamic Programming (Fibonacci Numbers) Divide-and-Conquer (DAC) vs Dynamic Programming (DP) Development of a DP Algorithms Matrix-Chain Multiplication and Analysis</a:t>
                       </a:r>
                     </a:p>
                   </a:txBody>
@@ -6981,7 +7207,7 @@
                       </a:pPr>
                       <a:r>
                         <a:rPr/>
-                        <a:t>Week 3</a:t>
+                        <a:t>Week-6</a:t>
                       </a:r>
                     </a:p>
                   </a:txBody>
@@ -6997,7 +7223,7 @@
                       </a:pPr>
                       <a:r>
                         <a:rPr/>
-                        <a:t>TBD</a:t>
+                        <a:t>28.03.2023 31.03.2023</a:t>
                       </a:r>
                     </a:p>
                   </a:txBody>
@@ -7013,7 +7239,7 @@
                       </a:pPr>
                       <a:r>
                         <a:rPr/>
-                        <a:t>Matrix Multiplication(Traditional,Recursive,Strassen),Quicksort(Hoare and Lomuto Partitioning,Recursive Sorting),Quicksort Analysis,Randomized Quicksort, Randomized Selection(Recursive,Medians)</a:t>
+                        <a:t>Elements of Dynamic Programming Recursive Matrix Chain Order Memoization (Top-Down Approach, RMC, MemoizedMatrixChain, LookupC) Dynamic Programming vs. Memoization Longest Common Subsequence (LCS) Most Common Dynamic Programming Interview Questions, Greedy Algorithms and Dynamic Programming Differences Greedy Algorithms (Activity Selection Problem, Knapsack Problems)</a:t>
                       </a:r>
                     </a:p>
                   </a:txBody>
@@ -7029,7 +7255,7 @@
                       </a:pPr>
                       <a:r>
                         <a:rPr/>
-                        <a:t>TBD</a:t>
+                        <a:t>Midterm Homework-2 Will Be Sent on 28.03.2023</a:t>
                       </a:r>
                     </a:p>
                   </a:txBody>
@@ -7047,7 +7273,7 @@
                       </a:pPr>
                       <a:r>
                         <a:rPr/>
-                        <a:t>Week 4</a:t>
+                        <a:t>Week-7</a:t>
                       </a:r>
                     </a:p>
                   </a:txBody>
@@ -7062,7 +7288,7 @@
                       </a:pPr>
                       <a:r>
                         <a:rPr/>
-                        <a:t>TBD</a:t>
+                        <a:t>04.04.2023 07.04.2023</a:t>
                       </a:r>
                     </a:p>
                   </a:txBody>
@@ -7077,7 +7303,7 @@
                       </a:pPr>
                       <a:r>
                         <a:rPr/>
-                        <a:t>Heaps (Max / Min Heap, Heap Data Structure, Iterative and Recursive Heapify, Extract-Max, Build Heap) Heap Sort, Priority Queues, Linked Lists, Radix Sort,Counting Sort</a:t>
+                        <a:t>Midterm Homework-2 Controls and Review with Summary</a:t>
                       </a:r>
                     </a:p>
                   </a:txBody>
@@ -7092,7 +7318,7 @@
                       </a:pPr>
                       <a:r>
                         <a:rPr/>
-                        <a:t>TBD</a:t>
+                        <a:t>Midterm Homework-2 Due Date 04.04.2023</a:t>
                       </a:r>
                     </a:p>
                   </a:txBody>
@@ -7109,7 +7335,7 @@
                       </a:pPr>
                       <a:r>
                         <a:rPr/>
-                        <a:t>Week 5</a:t>
+                        <a:t>Week-8</a:t>
                       </a:r>
                     </a:p>
                   </a:txBody>
@@ -7124,7 +7350,7 @@
                       </a:pPr>
                       <a:r>
                         <a:rPr/>
-                        <a:t>TBD</a:t>
+                        <a:t>08.04.2023 16.04.2023</a:t>
                       </a:r>
                     </a:p>
                   </a:txBody>
@@ -7138,8 +7364,8 @@
                         <a:buNone/>
                       </a:pPr>
                       <a:r>
-                        <a:rPr/>
-                        <a:t>Convex Hull (Divide &amp; Conquer) Dynamic Programming (Fibonacci Numbers) Divide-and-Conquer (DAC) vs Dynamic Programming (DP) Development of a DP Algorithms Matrix-Chain Multiplication and Analysis</a:t>
+                        <a:rPr b="1"/>
+                        <a:t>Midterm</a:t>
                       </a:r>
                     </a:p>
                   </a:txBody>
@@ -7223,11 +7449,106 @@
                       </a:pPr>
                       <a:r>
                         <a:rPr/>
-                        <a:t>Week-6</a:t>
+                        <a:t>Week-9</a:t>
                       </a:r>
                     </a:p>
                   </a:txBody>
                   <a:tcPr/>
+                </a:tc>
+                <a:tc>
+                  <a:txBody>
+                    <a:bodyPr/>
+                    <a:lstStyle/>
+                    <a:p>
+                      <a:pPr lvl="0" indent="0" marL="0" algn="l">
+                        <a:buNone/>
+                      </a:pPr>
+                      <a:r>
+                        <a:rPr/>
+                        <a:t>18.04.2023 21.04.2023</a:t>
+                      </a:r>
+                    </a:p>
+                  </a:txBody>
+                  <a:tcPr/>
+                </a:tc>
+                <a:tc>
+                  <a:txBody>
+                    <a:bodyPr/>
+                    <a:lstStyle/>
+                    <a:p>
+                      <a:pPr lvl="0" indent="0" marL="0" algn="l">
+                        <a:buNone/>
+                      </a:pPr>
+                      <a:r>
+                        <a:rPr/>
+                        <a:t>Heap Data Structure, Heap Sort, Huffman Coding</a:t>
+                      </a:r>
+                    </a:p>
+                  </a:txBody>
+                  <a:tcPr/>
+                </a:tc>
+                <a:tc>
+                  <a:txBody>
+                    <a:bodyPr/>
+                    <a:lstStyle/>
+                    <a:p>
+                      <a:pPr lvl="0" indent="0" marL="0" algn="l">
+                        <a:buNone/>
+                      </a:pPr>
+                      <a:r>
+                        <a:rPr/>
+                        <a:t>21.04.2023 Ramadan Holiday-1</a:t>
+                      </a:r>
+                    </a:p>
+                  </a:txBody>
+                  <a:tcPr/>
+                </a:tc>
+              </a:tr>
+              <a:tr h="0">
+                <a:tc>
+                  <a:txBody>
+                    <a:bodyPr/>
+                    <a:lstStyle/>
+                    <a:p>
+                      <a:pPr lvl="0" indent="0" marL="0" algn="l">
+                        <a:buNone/>
+                      </a:pPr>
+                      <a:r>
+                        <a:rPr/>
+                        <a:t>Week-10</a:t>
+                      </a:r>
+                    </a:p>
+                  </a:txBody>
+                </a:tc>
+                <a:tc>
+                  <a:txBody>
+                    <a:bodyPr/>
+                    <a:lstStyle/>
+                    <a:p>
+                      <a:pPr lvl="0" indent="0" marL="0" algn="l">
+                        <a:buNone/>
+                      </a:pPr>
+                      <a:r>
+                        <a:rPr/>
+                        <a:t>25.04.2023 28.04.2023</a:t>
+                      </a:r>
+                    </a:p>
+                  </a:txBody>
+                </a:tc>
+                <a:tc>
+                  <a:txBody>
+                    <a:bodyPr/>
+                    <a:lstStyle/>
+                    <a:p>
+                      <a:pPr lvl="0" indent="0" marL="0" algn="l">
+                        <a:buNone/>
+                      </a:pPr>
+                      <a:r>
+                        <a:rPr/>
+                        <a:t>Introduction to Graphs, Gr,aphs and Representation, BFS (Breath-First Search), DFS (Depth-First Search), Topological Order, SCC (Strongly Connected Components), MST, Prim, Kruskal Disjoint Sets and Kruskal Relationships,Single-Source Shortest Path,(Bellman- Ford,Dijkstra),</a:t>
+                      </a:r>
+                    </a:p>
+                  </a:txBody>
                 </a:tc>
                 <a:tc>
                   <a:txBody>
@@ -7243,39 +7564,6 @@
                       </a:r>
                     </a:p>
                   </a:txBody>
-                  <a:tcPr/>
-                </a:tc>
-                <a:tc>
-                  <a:txBody>
-                    <a:bodyPr/>
-                    <a:lstStyle/>
-                    <a:p>
-                      <a:pPr lvl="0" indent="0" marL="0" algn="l">
-                        <a:buNone/>
-                      </a:pPr>
-                      <a:r>
-                        <a:rPr/>
-                        <a:t>Elements of Dynamic Programming Recursive Matrix Chain Order Memoization (Top-Down Approach, RMC, MemoizedMatrixChain, LookupC) Dynamic Programming vs. Memoization Longest Common Subsequence (LCS) Most Common Dynamic Programming Interview Questions</a:t>
-                      </a:r>
-                    </a:p>
-                  </a:txBody>
-                  <a:tcPr/>
-                </a:tc>
-                <a:tc>
-                  <a:txBody>
-                    <a:bodyPr/>
-                    <a:lstStyle/>
-                    <a:p>
-                      <a:pPr lvl="0" indent="0" marL="0" algn="l">
-                        <a:buNone/>
-                      </a:pPr>
-                      <a:r>
-                        <a:rPr/>
-                        <a:t>TBD</a:t>
-                      </a:r>
-                    </a:p>
-                  </a:txBody>
-                  <a:tcPr/>
                 </a:tc>
               </a:tr>
               <a:tr h="0">
@@ -7289,7 +7577,7 @@
                       </a:pPr>
                       <a:r>
                         <a:rPr/>
-                        <a:t>Week-7</a:t>
+                        <a:t>Week-11</a:t>
                       </a:r>
                     </a:p>
                   </a:txBody>
@@ -7304,7 +7592,7 @@
                       </a:pPr>
                       <a:r>
                         <a:rPr/>
-                        <a:t>TBD</a:t>
+                        <a:t>02.05.2023 05.05.2023</a:t>
                       </a:r>
                     </a:p>
                   </a:txBody>
@@ -7319,7 +7607,7 @@
                       </a:pPr>
                       <a:r>
                         <a:rPr/>
-                        <a:t>Greedy Algorithms and Dynamic Programming Differences Greedy Algorithms (Activity Selection Problem, Knapsack Problems)</a:t>
+                        <a:t>Q-Learning Shortest Path,Max-Flow Min-Cut (Ford-Fulkerson,Edmond’s Karp,Dinic) Crypto++ Library Usage, Hashing and Integrity Control, Cryptographic Hash Functions (SHA-1,SHA-256,SHA-512,H-MAC), Checksums(MD5,CRC32)</a:t>
                       </a:r>
                     </a:p>
                   </a:txBody>
@@ -7334,69 +7622,7 @@
                       </a:pPr>
                       <a:r>
                         <a:rPr/>
-                        <a:t>TBD</a:t>
-                      </a:r>
-                    </a:p>
-                  </a:txBody>
-                </a:tc>
-              </a:tr>
-              <a:tr h="0">
-                <a:tc>
-                  <a:txBody>
-                    <a:bodyPr/>
-                    <a:lstStyle/>
-                    <a:p>
-                      <a:pPr lvl="0" indent="0" marL="0" algn="l">
-                        <a:buNone/>
-                      </a:pPr>
-                      <a:r>
-                        <a:rPr/>
-                        <a:t>Week-8</a:t>
-                      </a:r>
-                    </a:p>
-                  </a:txBody>
-                </a:tc>
-                <a:tc>
-                  <a:txBody>
-                    <a:bodyPr/>
-                    <a:lstStyle/>
-                    <a:p>
-                      <a:pPr lvl="0" indent="0" marL="0" algn="l">
-                        <a:buNone/>
-                      </a:pPr>
-                      <a:r>
-                        <a:rPr/>
-                        <a:t>TBD</a:t>
-                      </a:r>
-                    </a:p>
-                  </a:txBody>
-                </a:tc>
-                <a:tc>
-                  <a:txBody>
-                    <a:bodyPr/>
-                    <a:lstStyle/>
-                    <a:p>
-                      <a:pPr lvl="0" indent="0" marL="0" algn="l">
-                        <a:buNone/>
-                      </a:pPr>
-                      <a:r>
-                        <a:rPr b="1"/>
-                        <a:t>Midterm</a:t>
-                      </a:r>
-                    </a:p>
-                  </a:txBody>
-                </a:tc>
-                <a:tc>
-                  <a:txBody>
-                    <a:bodyPr/>
-                    <a:lstStyle/>
-                    <a:p>
-                      <a:pPr lvl="0" indent="0" marL="0" algn="l">
-                        <a:buNone/>
-                      </a:pPr>
-                      <a:r>
-                        <a:rPr/>
-                        <a:t>TBD</a:t>
+                        <a:t>Final Homework-1 Will Be Sent on 02.05.2023</a:t>
                       </a:r>
                     </a:p>
                   </a:txBody>
@@ -7465,7 +7691,7 @@
                       </a:pPr>
                       <a:r>
                         <a:rPr/>
-                        <a:t>Week-9</a:t>
+                        <a:t>Week-12</a:t>
                       </a:r>
                     </a:p>
                   </a:txBody>
@@ -7481,7 +7707,7 @@
                       </a:pPr>
                       <a:r>
                         <a:rPr/>
-                        <a:t>TBD</a:t>
+                        <a:t>09.05.2023 12.05.2023</a:t>
                       </a:r>
                     </a:p>
                   </a:txBody>
@@ -7497,7 +7723,7 @@
                       </a:pPr>
                       <a:r>
                         <a:rPr/>
-                        <a:t>Heap Data Structure, Heap Sort, Huffman Coding</a:t>
+                        <a:t>Final Homework-1 Controls and Review with Summary</a:t>
                       </a:r>
                     </a:p>
                   </a:txBody>
@@ -7513,7 +7739,7 @@
                       </a:pPr>
                       <a:r>
                         <a:rPr/>
-                        <a:t>TBD</a:t>
+                        <a:t>Final Homework-1 Due Date 09.05.2023</a:t>
                       </a:r>
                     </a:p>
                   </a:txBody>
@@ -7531,7 +7757,7 @@
                       </a:pPr>
                       <a:r>
                         <a:rPr/>
-                        <a:t>Week-10</a:t>
+                        <a:t>Week-13</a:t>
                       </a:r>
                     </a:p>
                   </a:txBody>
@@ -7546,7 +7772,7 @@
                       </a:pPr>
                       <a:r>
                         <a:rPr/>
-                        <a:t>TBD</a:t>
+                        <a:t>16.05.2023 19.05.2023</a:t>
                       </a:r>
                     </a:p>
                   </a:txBody>
@@ -7561,7 +7787,7 @@
                       </a:pPr>
                       <a:r>
                         <a:rPr/>
-                        <a:t>Introduction to Graphs, Gr,aphs and Representation, BFS (Breath-First Search), DFS (Depth-First Search), Topological Order, SCC (Strongly Connected Components), MST, Prim, Kruskal</a:t>
+                        <a:t>Symmetric Encryption Algorithms (AES, DES, TDES), Symmetric Encryption Modes (ECB, CBC), Asymmetric Encryption, Key Pairs (Public-Private Key Pairs), Signature Generation and Validation</a:t>
                       </a:r>
                     </a:p>
                   </a:txBody>
@@ -7576,7 +7802,7 @@
                       </a:pPr>
                       <a:r>
                         <a:rPr/>
-                        <a:t>TBD</a:t>
+                        <a:t>19.05.2023 Holiday, Commemoration of Atatürk, Youth and Sports Day</a:t>
                       </a:r>
                     </a:p>
                   </a:txBody>
@@ -7593,7 +7819,7 @@
                       </a:pPr>
                       <a:r>
                         <a:rPr/>
-                        <a:t>Week-11</a:t>
+                        <a:t>Week-14</a:t>
                       </a:r>
                     </a:p>
                   </a:txBody>
@@ -7608,7 +7834,7 @@
                       </a:pPr>
                       <a:r>
                         <a:rPr/>
-                        <a:t>TBD</a:t>
+                        <a:t>23.05.2023 26.05.2023</a:t>
                       </a:r>
                     </a:p>
                   </a:txBody>
@@ -7623,7 +7849,7 @@
                       </a:pPr>
                       <a:r>
                         <a:rPr/>
-                        <a:t>Disjoint Sets and Kruskal Relationships,Single-Source Shortest Path,(Bellman- Ford,Dijkstra),Q-Learning Shortest Path,Max-Flow Min-Cut (Ford-Fulkerson,Edmond’s Karp,Dinic)</a:t>
+                        <a:t>OTP Calculation(Time-based, Counter-based),File Encryption and Decryption and Integrity Control Operations</a:t>
                       </a:r>
                     </a:p>
                   </a:txBody>
@@ -7638,7 +7864,7 @@
                       </a:pPr>
                       <a:r>
                         <a:rPr/>
-                        <a:t>TBD</a:t>
+                        <a:t>Final Homework-2 Will Be Sent on 23.05.2023</a:t>
                       </a:r>
                     </a:p>
                   </a:txBody>
@@ -7707,7 +7933,7 @@
                       </a:pPr>
                       <a:r>
                         <a:rPr/>
-                        <a:t>Week-12</a:t>
+                        <a:t>Week-15</a:t>
                       </a:r>
                     </a:p>
                   </a:txBody>
@@ -7723,7 +7949,7 @@
                       </a:pPr>
                       <a:r>
                         <a:rPr/>
-                        <a:t>TBD</a:t>
+                        <a:t>30.05.2023 02.06.2023</a:t>
                       </a:r>
                     </a:p>
                   </a:txBody>
@@ -7739,7 +7965,7 @@
                       </a:pPr>
                       <a:r>
                         <a:rPr/>
-                        <a:t>Crypto++ Library Usage, Hashing and Integrity Control, Cryptographic Hash Functions (SHA-1,SHA-256,SHA-512,H-MAC), Checksums(MD5,CRC32)</a:t>
+                        <a:t>Final Homework-2 Controls and Review with Summary</a:t>
                       </a:r>
                     </a:p>
                   </a:txBody>
@@ -7755,7 +7981,7 @@
                       </a:pPr>
                       <a:r>
                         <a:rPr/>
-                        <a:t>TBD</a:t>
+                        <a:t>Final Homework-2 Due Date 30.05.2023</a:t>
                       </a:r>
                     </a:p>
                   </a:txBody>
@@ -7773,7 +7999,7 @@
                       </a:pPr>
                       <a:r>
                         <a:rPr/>
-                        <a:t>Week-13</a:t>
+                        <a:t>Week-16</a:t>
                       </a:r>
                     </a:p>
                   </a:txBody>
@@ -7788,7 +8014,7 @@
                       </a:pPr>
                       <a:r>
                         <a:rPr/>
-                        <a:t>TBD</a:t>
+                        <a:t>03.06.2023 11.06.2023</a:t>
                       </a:r>
                     </a:p>
                   </a:txBody>
@@ -7802,85 +8028,23 @@
                         <a:buNone/>
                       </a:pPr>
                       <a:r>
+                        <a:rPr b="1"/>
+                        <a:t>Final</a:t>
+                      </a:r>
+                    </a:p>
+                  </a:txBody>
+                </a:tc>
+                <a:tc>
+                  <a:txBody>
+                    <a:bodyPr/>
+                    <a:lstStyle/>
+                    <a:p>
+                      <a:pPr lvl="0" indent="0" marL="0" algn="l">
+                        <a:buNone/>
+                      </a:pPr>
+                      <a:r>
                         <a:rPr/>
-                        <a:t>Symmetric Encryption Algorithms (AES, DES, TDES), Symmetric Encryption Modes (ECB, CBC), Asymmetric Encryption, Key Pairs (Public-Private Key Pairs), Signature Generation and Validation</a:t>
-                      </a:r>
-                    </a:p>
-                  </a:txBody>
-                </a:tc>
-                <a:tc>
-                  <a:txBody>
-                    <a:bodyPr/>
-                    <a:lstStyle/>
-                    <a:p>
-                      <a:pPr lvl="0" indent="0" marL="0" algn="l">
-                        <a:buNone/>
-                      </a:pPr>
-                      <a:r>
-                        <a:rPr/>
-                        <a:t>TBD</a:t>
-                      </a:r>
-                    </a:p>
-                  </a:txBody>
-                </a:tc>
-              </a:tr>
-              <a:tr h="0">
-                <a:tc>
-                  <a:txBody>
-                    <a:bodyPr/>
-                    <a:lstStyle/>
-                    <a:p>
-                      <a:pPr lvl="0" indent="0" marL="0" algn="l">
-                        <a:buNone/>
-                      </a:pPr>
-                      <a:r>
-                        <a:rPr/>
-                        <a:t>Week-14</a:t>
-                      </a:r>
-                    </a:p>
-                  </a:txBody>
-                </a:tc>
-                <a:tc>
-                  <a:txBody>
-                    <a:bodyPr/>
-                    <a:lstStyle/>
-                    <a:p>
-                      <a:pPr lvl="0" indent="0" marL="0" algn="l">
-                        <a:buNone/>
-                      </a:pPr>
-                      <a:r>
-                        <a:rPr/>
-                        <a:t>TBD</a:t>
-                      </a:r>
-                    </a:p>
-                  </a:txBody>
-                </a:tc>
-                <a:tc>
-                  <a:txBody>
-                    <a:bodyPr/>
-                    <a:lstStyle/>
-                    <a:p>
-                      <a:pPr lvl="0" indent="0" marL="0" algn="l">
-                        <a:buNone/>
-                      </a:pPr>
-                      <a:r>
-                        <a:rPr/>
-                        <a:t>OTP Calculation(Time-based, Counter-based),File Encryption and Decryption and Integrity Control Operations</a:t>
-                      </a:r>
-                    </a:p>
-                  </a:txBody>
-                </a:tc>
-                <a:tc>
-                  <a:txBody>
-                    <a:bodyPr/>
-                    <a:lstStyle/>
-                    <a:p>
-                      <a:pPr lvl="0" indent="0" marL="0" algn="l">
-                        <a:buNone/>
-                      </a:pPr>
-                      <a:r>
-                        <a:rPr/>
-                        <a:t>TBD</a:t>
+                        <a:t>There won’t be makeup exams for homeworks</a:t>
                       </a:r>
                     </a:p>
                   </a:txBody>
@@ -7912,220 +8076,40 @@
           <a:chExt cx="0" cy="0"/>
         </a:xfrm>
       </p:grpSpPr>
-      <p:graphicFrame>
-        <p:nvGraphicFramePr>
-          <p:cNvPr id="6" name="Content Placeholder 5"/>
-          <p:cNvGraphicFramePr>
-            <a:graphicFrameLocks noGrp="1"/>
-          </p:cNvGraphicFramePr>
+      <p:sp>
+        <p:nvSpPr>
+          <p:cNvPr id="3" name="Content Placeholder 2"/>
+          <p:cNvSpPr>
+            <a:spLocks noGrp="1"/>
+          </p:cNvSpPr>
           <p:nvPr>
             <p:ph idx="1"/>
           </p:nvPr>
-        </p:nvGraphicFramePr>
-        <p:xfrm>
-          <a:off x="457200" y="1600200"/>
-          <a:ext cx="8229600" cy="4521200"/>
-        </p:xfrm>
-        <a:graphic>
-          <a:graphicData uri="http://schemas.openxmlformats.org/drawingml/2006/table">
-            <a:tbl>
-              <a:tblPr firstRow="1" bandRow="1">
-                <a:tableStyleId>{5C22544A-7EE6-4342-B048-85BDC9FD1C3A}</a:tableStyleId>
-              </a:tblPr>
-              <a:tblGrid>
-                <a:gridCol w="2057400"/>
-                <a:gridCol w="2057400"/>
-                <a:gridCol w="2057400"/>
-                <a:gridCol w="2057400"/>
-              </a:tblGrid>
-              <a:tr h="0">
-                <a:tc>
-                  <a:txBody>
-                    <a:bodyPr/>
-                    <a:lstStyle/>
-                    <a:p>
-                      <a:pPr lvl="0" indent="0" marL="0" algn="l">
-                        <a:buNone/>
-                      </a:pPr>
-                      <a:r>
-                        <a:rPr/>
-                        <a:t>Week-15</a:t>
-                      </a:r>
-                    </a:p>
-                  </a:txBody>
-                  <a:tcPr/>
-                </a:tc>
-                <a:tc>
-                  <a:txBody>
-                    <a:bodyPr/>
-                    <a:lstStyle/>
-                    <a:p>
-                      <a:pPr lvl="0" indent="0" marL="0" algn="l">
-                        <a:buNone/>
-                      </a:pPr>
-                      <a:r>
-                        <a:rPr/>
-                        <a:t>TBD</a:t>
-                      </a:r>
-                    </a:p>
-                  </a:txBody>
-                  <a:tcPr/>
-                </a:tc>
-                <a:tc>
-                  <a:txBody>
-                    <a:bodyPr/>
-                    <a:lstStyle/>
-                    <a:p>
-                      <a:pPr lvl="0" indent="0" marL="0" algn="l">
-                        <a:buNone/>
-                      </a:pPr>
-                      <a:r>
-                        <a:rPr/>
-                        <a:t>Review</a:t>
-                      </a:r>
-                    </a:p>
-                  </a:txBody>
-                  <a:tcPr/>
-                </a:tc>
-                <a:tc>
-                  <a:txBody>
-                    <a:bodyPr/>
-                    <a:lstStyle/>
-                    <a:p>
-                      <a:pPr lvl="0" indent="0" marL="0" algn="l">
-                        <a:buNone/>
-                      </a:pPr>
-                      <a:r>
-                        <a:rPr/>
-                        <a:t>TBD</a:t>
-                      </a:r>
-                    </a:p>
-                  </a:txBody>
-                  <a:tcPr/>
-                </a:tc>
-              </a:tr>
-              <a:tr h="0">
-                <a:tc>
-                  <a:txBody>
-                    <a:bodyPr/>
-                    <a:lstStyle/>
-                    <a:p>
-                      <a:pPr lvl="0" indent="0" marL="0" algn="l">
-                        <a:buNone/>
-                      </a:pPr>
-                      <a:r>
-                        <a:rPr/>
-                        <a:t>Week-16</a:t>
-                      </a:r>
-                    </a:p>
-                  </a:txBody>
-                </a:tc>
-                <a:tc>
-                  <a:txBody>
-                    <a:bodyPr/>
-                    <a:lstStyle/>
-                    <a:p>
-                      <a:pPr lvl="0" indent="0" marL="0" algn="l">
-                        <a:buNone/>
-                      </a:pPr>
-                      <a:r>
-                        <a:rPr/>
-                        <a:t>TBD</a:t>
-                      </a:r>
-                    </a:p>
-                  </a:txBody>
-                </a:tc>
-                <a:tc>
-                  <a:txBody>
-                    <a:bodyPr/>
-                    <a:lstStyle/>
-                    <a:p>
-                      <a:pPr lvl="0" indent="0" marL="0" algn="l">
-                        <a:buNone/>
-                      </a:pPr>
-                      <a:r>
-                        <a:rPr b="1"/>
-                        <a:t>Final</a:t>
-                      </a:r>
-                    </a:p>
-                  </a:txBody>
-                </a:tc>
-                <a:tc>
-                  <a:txBody>
-                    <a:bodyPr/>
-                    <a:lstStyle/>
-                    <a:p>
-                      <a:pPr lvl="0" indent="0" marL="0" algn="l">
-                        <a:buNone/>
-                      </a:pPr>
-                      <a:r>
-                        <a:rPr/>
-                        <a:t>TBD</a:t>
-                      </a:r>
-                    </a:p>
-                  </a:txBody>
-                </a:tc>
-              </a:tr>
-            </a:tbl>
-          </a:graphicData>
-        </a:graphic>
-      </p:graphicFrame>
+        </p:nvSpPr>
+        <p:spPr/>
+        <p:txBody>
+          <a:bodyPr/>
+          <a:lstStyle/>
+          <a:p>
+            <a:pPr lvl="0" indent="0" marL="0">
+              <a:spcBef>
+                <a:spcPts val="3000"/>
+              </a:spcBef>
+              <a:buNone/>
+            </a:pPr>
+            <a:r>
+              <a:rPr b="1"/>
+              <a:t>Bologna Information</a:t>
+            </a:r>
+          </a:p>
+        </p:txBody>
+      </p:sp>
     </p:spTree>
   </p:cSld>
 </p:sld>
 </file>
 
 <file path=ppt/slides/slide58.xml><?xml version="1.0" encoding="utf-8"?>
-<p:sld xmlns:a="http://schemas.openxmlformats.org/drawingml/2006/main" xmlns:r="http://schemas.openxmlformats.org/officeDocument/2006/relationships" xmlns:p="http://schemas.openxmlformats.org/presentationml/2006/main">
-  <p:cSld>
-    <p:spTree>
-      <p:nvGrpSpPr>
-        <p:cNvPr id="1" name=""/>
-        <p:cNvGrpSpPr/>
-        <p:nvPr/>
-      </p:nvGrpSpPr>
-      <p:grpSpPr>
-        <a:xfrm>
-          <a:off x="0" y="0"/>
-          <a:ext cx="0" cy="0"/>
-          <a:chOff x="0" y="0"/>
-          <a:chExt cx="0" cy="0"/>
-        </a:xfrm>
-      </p:grpSpPr>
-      <p:sp>
-        <p:nvSpPr>
-          <p:cNvPr id="3" name="Content Placeholder 2"/>
-          <p:cNvSpPr>
-            <a:spLocks noGrp="1"/>
-          </p:cNvSpPr>
-          <p:nvPr>
-            <p:ph idx="1"/>
-          </p:nvPr>
-        </p:nvSpPr>
-        <p:spPr/>
-        <p:txBody>
-          <a:bodyPr/>
-          <a:lstStyle/>
-          <a:p>
-            <a:pPr lvl="0" indent="0" marL="0">
-              <a:spcBef>
-                <a:spcPts val="3000"/>
-              </a:spcBef>
-              <a:buNone/>
-            </a:pPr>
-            <a:r>
-              <a:rPr b="1"/>
-              <a:t>Bologna Information</a:t>
-            </a:r>
-          </a:p>
-        </p:txBody>
-      </p:sp>
-    </p:spTree>
-  </p:cSld>
-</p:sld>
-</file>
-
-<file path=ppt/slides/slide59.xml><?xml version="1.0" encoding="utf-8"?>
 <p:sld xmlns:a="http://schemas.openxmlformats.org/drawingml/2006/main" xmlns:r="http://schemas.openxmlformats.org/officeDocument/2006/relationships" xmlns:p="http://schemas.openxmlformats.org/presentationml/2006/main">
   <p:cSld>
     <p:spTree>
@@ -8310,7 +8294,7 @@
                       </a:pPr>
                       <a:r>
                         <a:rPr/>
-                        <a:t>İBBF 402 Level-4</a:t>
+                        <a:t>İBBF 402 Level-4 or Online Google Meet / Microsoft Teams</a:t>
                       </a:r>
                     </a:p>
                   </a:txBody>
@@ -8343,7 +8327,7 @@
                       </a:pPr>
                       <a:r>
                         <a:rPr/>
-                        <a:t>Meetings will be scheduled over Google Meet with your university account and email and performed via demand emails. Please send emails with the subject starting with </a:t>
+                        <a:t>Meetings will be scheduled over Google Meet or Microsoft Teams with your university account and email and performed via demand emails. Please send emails with the subject starting with </a:t>
                       </a:r>
                       <a:r>
                         <a:rPr i="1"/>

</xml_diff>